<commit_message>
Provide PDF of Ophelia setlist
</commit_message>
<xml_diff>
--- a/resources/soundcloud.pptx
+++ b/resources/soundcloud.pptx
@@ -309,7 +309,7 @@
           <a:p>
             <a:fld id="{226C7FB1-4831-6A4C-9DF2-6EA9AA49499B}" type="datetimeFigureOut">
               <a:rPr lang="en-US" smtClean="0"/>
-              <a:t>6/14/18</a:t>
+              <a:t>7/21/18</a:t>
             </a:fld>
             <a:endParaRPr lang="en-US"/>
           </a:p>
@@ -477,7 +477,7 @@
           <a:p>
             <a:fld id="{226C7FB1-4831-6A4C-9DF2-6EA9AA49499B}" type="datetimeFigureOut">
               <a:rPr lang="en-US" smtClean="0"/>
-              <a:t>6/14/18</a:t>
+              <a:t>7/21/18</a:t>
             </a:fld>
             <a:endParaRPr lang="en-US"/>
           </a:p>
@@ -655,7 +655,7 @@
           <a:p>
             <a:fld id="{226C7FB1-4831-6A4C-9DF2-6EA9AA49499B}" type="datetimeFigureOut">
               <a:rPr lang="en-US" smtClean="0"/>
-              <a:t>6/14/18</a:t>
+              <a:t>7/21/18</a:t>
             </a:fld>
             <a:endParaRPr lang="en-US"/>
           </a:p>
@@ -823,7 +823,7 @@
           <a:p>
             <a:fld id="{226C7FB1-4831-6A4C-9DF2-6EA9AA49499B}" type="datetimeFigureOut">
               <a:rPr lang="en-US" smtClean="0"/>
-              <a:t>6/14/18</a:t>
+              <a:t>7/21/18</a:t>
             </a:fld>
             <a:endParaRPr lang="en-US"/>
           </a:p>
@@ -1068,7 +1068,7 @@
           <a:p>
             <a:fld id="{226C7FB1-4831-6A4C-9DF2-6EA9AA49499B}" type="datetimeFigureOut">
               <a:rPr lang="en-US" smtClean="0"/>
-              <a:t>6/14/18</a:t>
+              <a:t>7/21/18</a:t>
             </a:fld>
             <a:endParaRPr lang="en-US"/>
           </a:p>
@@ -1353,7 +1353,7 @@
           <a:p>
             <a:fld id="{226C7FB1-4831-6A4C-9DF2-6EA9AA49499B}" type="datetimeFigureOut">
               <a:rPr lang="en-US" smtClean="0"/>
-              <a:t>6/14/18</a:t>
+              <a:t>7/21/18</a:t>
             </a:fld>
             <a:endParaRPr lang="en-US"/>
           </a:p>
@@ -1777,7 +1777,7 @@
           <a:p>
             <a:fld id="{226C7FB1-4831-6A4C-9DF2-6EA9AA49499B}" type="datetimeFigureOut">
               <a:rPr lang="en-US" smtClean="0"/>
-              <a:t>6/14/18</a:t>
+              <a:t>7/21/18</a:t>
             </a:fld>
             <a:endParaRPr lang="en-US"/>
           </a:p>
@@ -1894,7 +1894,7 @@
           <a:p>
             <a:fld id="{226C7FB1-4831-6A4C-9DF2-6EA9AA49499B}" type="datetimeFigureOut">
               <a:rPr lang="en-US" smtClean="0"/>
-              <a:t>6/14/18</a:t>
+              <a:t>7/21/18</a:t>
             </a:fld>
             <a:endParaRPr lang="en-US"/>
           </a:p>
@@ -1989,7 +1989,7 @@
           <a:p>
             <a:fld id="{226C7FB1-4831-6A4C-9DF2-6EA9AA49499B}" type="datetimeFigureOut">
               <a:rPr lang="en-US" smtClean="0"/>
-              <a:t>6/14/18</a:t>
+              <a:t>7/21/18</a:t>
             </a:fld>
             <a:endParaRPr lang="en-US"/>
           </a:p>
@@ -2264,7 +2264,7 @@
           <a:p>
             <a:fld id="{226C7FB1-4831-6A4C-9DF2-6EA9AA49499B}" type="datetimeFigureOut">
               <a:rPr lang="en-US" smtClean="0"/>
-              <a:t>6/14/18</a:t>
+              <a:t>7/21/18</a:t>
             </a:fld>
             <a:endParaRPr lang="en-US"/>
           </a:p>
@@ -2516,7 +2516,7 @@
           <a:p>
             <a:fld id="{226C7FB1-4831-6A4C-9DF2-6EA9AA49499B}" type="datetimeFigureOut">
               <a:rPr lang="en-US" smtClean="0"/>
-              <a:t>6/14/18</a:t>
+              <a:t>7/21/18</a:t>
             </a:fld>
             <a:endParaRPr lang="en-US"/>
           </a:p>
@@ -2727,7 +2727,7 @@
           <a:p>
             <a:fld id="{226C7FB1-4831-6A4C-9DF2-6EA9AA49499B}" type="datetimeFigureOut">
               <a:rPr lang="en-US" smtClean="0"/>
-              <a:t>6/14/18</a:t>
+              <a:t>7/21/18</a:t>
             </a:fld>
             <a:endParaRPr lang="en-US"/>
           </a:p>
@@ -3192,10 +3192,7 @@
     <p:bg>
       <p:bgPr>
         <a:solidFill>
-          <a:schemeClr val="accent6">
-            <a:lumMod val="60000"/>
-            <a:lumOff val="40000"/>
-          </a:schemeClr>
+          <a:srgbClr val="C921FA"/>
         </a:solidFill>
         <a:effectLst/>
       </p:bgPr>
@@ -3239,7 +3236,7 @@
             <a:r>
               <a:rPr lang="en-US" sz="9600" b="1" dirty="0">
                 <a:solidFill>
-                  <a:srgbClr val="C00000"/>
+                  <a:schemeClr val="bg1"/>
                 </a:solidFill>
               </a:rPr>
               <a:t>HSJ</a:t>
@@ -3247,32 +3244,32 @@
             <a:br>
               <a:rPr lang="en-US" sz="9600" b="1" dirty="0">
                 <a:solidFill>
-                  <a:srgbClr val="C00000"/>
+                  <a:schemeClr val="bg1"/>
                 </a:solidFill>
               </a:rPr>
             </a:br>
             <a:r>
               <a:rPr lang="en-US" sz="9600" b="1" dirty="0">
                 <a:solidFill>
-                  <a:srgbClr val="C00000"/>
+                  <a:schemeClr val="bg1"/>
                 </a:solidFill>
               </a:rPr>
-              <a:t>August</a:t>
+              <a:t>July</a:t>
             </a:r>
             <a:br>
               <a:rPr lang="en-US" sz="9600" b="1" dirty="0">
                 <a:solidFill>
-                  <a:srgbClr val="C00000"/>
+                  <a:schemeClr val="bg1"/>
                 </a:solidFill>
               </a:rPr>
             </a:br>
             <a:r>
               <a:rPr lang="en-US" sz="9600" b="1" dirty="0">
                 <a:solidFill>
-                  <a:srgbClr val="C00000"/>
+                  <a:schemeClr val="bg1"/>
                 </a:solidFill>
               </a:rPr>
-              <a:t>2017</a:t>
+              <a:t>2018</a:t>
             </a:r>
           </a:p>
         </p:txBody>

</xml_diff>

<commit_message>
HSJ Aug and Sep and Oct
</commit_message>
<xml_diff>
--- a/resources/soundcloud.pptx
+++ b/resources/soundcloud.pptx
@@ -4,6 +4,9 @@
   <p:sldMasterIdLst>
     <p:sldMasterId id="2147483648" r:id="rId1"/>
   </p:sldMasterIdLst>
+  <p:notesMasterIdLst>
+    <p:notesMasterId r:id="rId12"/>
+  </p:notesMasterIdLst>
   <p:sldIdLst>
     <p:sldId id="256" r:id="rId2"/>
     <p:sldId id="259" r:id="rId3"/>
@@ -13,7 +16,8 @@
     <p:sldId id="260" r:id="rId7"/>
     <p:sldId id="261" r:id="rId8"/>
     <p:sldId id="264" r:id="rId9"/>
-    <p:sldId id="258" r:id="rId10"/>
+    <p:sldId id="266" r:id="rId10"/>
+    <p:sldId id="258" r:id="rId11"/>
   </p:sldIdLst>
   <p:sldSz cx="4572000" cy="4572000"/>
   <p:notesSz cx="6858000" cy="9144000"/>
@@ -114,7 +118,7 @@
   </p:defaultTextStyle>
   <p:extLst>
     <p:ext uri="{EFAFB233-063F-42B5-8137-9DF3F51BA10A}">
-      <p15:sldGuideLst xmlns:p15="http://schemas.microsoft.com/office/powerpoint/2012/main" xmlns="">
+      <p15:sldGuideLst xmlns="" xmlns:p15="http://schemas.microsoft.com/office/powerpoint/2012/main">
         <p15:guide id="1" orient="horz" pos="1440">
           <p15:clr>
             <a:srgbClr val="A4A3A4"/>
@@ -129,6 +133,440 @@
     </p:ext>
   </p:extLst>
 </p:presentation>
+</file>
+
+<file path=ppt/notesMasters/notesMaster1.xml><?xml version="1.0" encoding="utf-8"?>
+<p:notesMaster xmlns:a="http://schemas.openxmlformats.org/drawingml/2006/main" xmlns:r="http://schemas.openxmlformats.org/officeDocument/2006/relationships" xmlns:p="http://schemas.openxmlformats.org/presentationml/2006/main">
+  <p:cSld>
+    <p:bg>
+      <p:bgRef idx="1001">
+        <a:schemeClr val="bg1"/>
+      </p:bgRef>
+    </p:bg>
+    <p:spTree>
+      <p:nvGrpSpPr>
+        <p:cNvPr id="1" name=""/>
+        <p:cNvGrpSpPr/>
+        <p:nvPr/>
+      </p:nvGrpSpPr>
+      <p:grpSpPr>
+        <a:xfrm>
+          <a:off x="0" y="0"/>
+          <a:ext cx="0" cy="0"/>
+          <a:chOff x="0" y="0"/>
+          <a:chExt cx="0" cy="0"/>
+        </a:xfrm>
+      </p:grpSpPr>
+      <p:sp>
+        <p:nvSpPr>
+          <p:cNvPr id="2" name="Header Placeholder 1"/>
+          <p:cNvSpPr>
+            <a:spLocks noGrp="1"/>
+          </p:cNvSpPr>
+          <p:nvPr>
+            <p:ph type="hdr" sz="quarter"/>
+          </p:nvPr>
+        </p:nvSpPr>
+        <p:spPr>
+          <a:xfrm>
+            <a:off x="0" y="0"/>
+            <a:ext cx="2971800" cy="457200"/>
+          </a:xfrm>
+          <a:prstGeom prst="rect">
+            <a:avLst/>
+          </a:prstGeom>
+        </p:spPr>
+        <p:txBody>
+          <a:bodyPr vert="horz" lIns="91440" tIns="45720" rIns="91440" bIns="45720" rtlCol="0"/>
+          <a:lstStyle>
+            <a:lvl1pPr algn="l">
+              <a:defRPr sz="1200"/>
+            </a:lvl1pPr>
+          </a:lstStyle>
+          <a:p>
+            <a:endParaRPr lang="en-US"/>
+          </a:p>
+        </p:txBody>
+      </p:sp>
+      <p:sp>
+        <p:nvSpPr>
+          <p:cNvPr id="3" name="Date Placeholder 2"/>
+          <p:cNvSpPr>
+            <a:spLocks noGrp="1"/>
+          </p:cNvSpPr>
+          <p:nvPr>
+            <p:ph type="dt" idx="1"/>
+          </p:nvPr>
+        </p:nvSpPr>
+        <p:spPr>
+          <a:xfrm>
+            <a:off x="3884613" y="0"/>
+            <a:ext cx="2971800" cy="457200"/>
+          </a:xfrm>
+          <a:prstGeom prst="rect">
+            <a:avLst/>
+          </a:prstGeom>
+        </p:spPr>
+        <p:txBody>
+          <a:bodyPr vert="horz" lIns="91440" tIns="45720" rIns="91440" bIns="45720" rtlCol="0"/>
+          <a:lstStyle>
+            <a:lvl1pPr algn="r">
+              <a:defRPr sz="1200"/>
+            </a:lvl1pPr>
+          </a:lstStyle>
+          <a:p>
+            <a:fld id="{08B30D70-D9E6-0042-997C-79AA6B350E63}" type="datetimeFigureOut">
+              <a:rPr lang="en-US" smtClean="0"/>
+              <a:t>10/1/18</a:t>
+            </a:fld>
+            <a:endParaRPr lang="en-US"/>
+          </a:p>
+        </p:txBody>
+      </p:sp>
+      <p:sp>
+        <p:nvSpPr>
+          <p:cNvPr id="4" name="Slide Image Placeholder 3"/>
+          <p:cNvSpPr>
+            <a:spLocks noGrp="1" noRot="1" noChangeAspect="1"/>
+          </p:cNvSpPr>
+          <p:nvPr>
+            <p:ph type="sldImg" idx="2"/>
+          </p:nvPr>
+        </p:nvSpPr>
+        <p:spPr>
+          <a:xfrm>
+            <a:off x="1714500" y="685800"/>
+            <a:ext cx="3429000" cy="3429000"/>
+          </a:xfrm>
+          <a:prstGeom prst="rect">
+            <a:avLst/>
+          </a:prstGeom>
+          <a:noFill/>
+          <a:ln w="12700">
+            <a:solidFill>
+              <a:prstClr val="black"/>
+            </a:solidFill>
+          </a:ln>
+        </p:spPr>
+        <p:txBody>
+          <a:bodyPr vert="horz" lIns="91440" tIns="45720" rIns="91440" bIns="45720" rtlCol="0" anchor="ctr"/>
+          <a:lstStyle/>
+          <a:p>
+            <a:endParaRPr lang="en-US"/>
+          </a:p>
+        </p:txBody>
+      </p:sp>
+      <p:sp>
+        <p:nvSpPr>
+          <p:cNvPr id="5" name="Notes Placeholder 4"/>
+          <p:cNvSpPr>
+            <a:spLocks noGrp="1"/>
+          </p:cNvSpPr>
+          <p:nvPr>
+            <p:ph type="body" sz="quarter" idx="3"/>
+          </p:nvPr>
+        </p:nvSpPr>
+        <p:spPr>
+          <a:xfrm>
+            <a:off x="685800" y="4343400"/>
+            <a:ext cx="5486400" cy="4114800"/>
+          </a:xfrm>
+          <a:prstGeom prst="rect">
+            <a:avLst/>
+          </a:prstGeom>
+        </p:spPr>
+        <p:txBody>
+          <a:bodyPr vert="horz" lIns="91440" tIns="45720" rIns="91440" bIns="45720" rtlCol="0"/>
+          <a:lstStyle/>
+          <a:p>
+            <a:pPr lvl="0"/>
+            <a:r>
+              <a:rPr lang="en-US" smtClean="0"/>
+              <a:t>Click to edit Master text styles</a:t>
+            </a:r>
+          </a:p>
+          <a:p>
+            <a:pPr lvl="1"/>
+            <a:r>
+              <a:rPr lang="en-US" smtClean="0"/>
+              <a:t>Second level</a:t>
+            </a:r>
+          </a:p>
+          <a:p>
+            <a:pPr lvl="2"/>
+            <a:r>
+              <a:rPr lang="en-US" smtClean="0"/>
+              <a:t>Third level</a:t>
+            </a:r>
+          </a:p>
+          <a:p>
+            <a:pPr lvl="3"/>
+            <a:r>
+              <a:rPr lang="en-US" smtClean="0"/>
+              <a:t>Fourth level</a:t>
+            </a:r>
+          </a:p>
+          <a:p>
+            <a:pPr lvl="4"/>
+            <a:r>
+              <a:rPr lang="en-US" smtClean="0"/>
+              <a:t>Fifth level</a:t>
+            </a:r>
+            <a:endParaRPr lang="en-US"/>
+          </a:p>
+        </p:txBody>
+      </p:sp>
+      <p:sp>
+        <p:nvSpPr>
+          <p:cNvPr id="6" name="Footer Placeholder 5"/>
+          <p:cNvSpPr>
+            <a:spLocks noGrp="1"/>
+          </p:cNvSpPr>
+          <p:nvPr>
+            <p:ph type="ftr" sz="quarter" idx="4"/>
+          </p:nvPr>
+        </p:nvSpPr>
+        <p:spPr>
+          <a:xfrm>
+            <a:off x="0" y="8685213"/>
+            <a:ext cx="2971800" cy="457200"/>
+          </a:xfrm>
+          <a:prstGeom prst="rect">
+            <a:avLst/>
+          </a:prstGeom>
+        </p:spPr>
+        <p:txBody>
+          <a:bodyPr vert="horz" lIns="91440" tIns="45720" rIns="91440" bIns="45720" rtlCol="0" anchor="b"/>
+          <a:lstStyle>
+            <a:lvl1pPr algn="l">
+              <a:defRPr sz="1200"/>
+            </a:lvl1pPr>
+          </a:lstStyle>
+          <a:p>
+            <a:endParaRPr lang="en-US"/>
+          </a:p>
+        </p:txBody>
+      </p:sp>
+      <p:sp>
+        <p:nvSpPr>
+          <p:cNvPr id="7" name="Slide Number Placeholder 6"/>
+          <p:cNvSpPr>
+            <a:spLocks noGrp="1"/>
+          </p:cNvSpPr>
+          <p:nvPr>
+            <p:ph type="sldNum" sz="quarter" idx="5"/>
+          </p:nvPr>
+        </p:nvSpPr>
+        <p:spPr>
+          <a:xfrm>
+            <a:off x="3884613" y="8685213"/>
+            <a:ext cx="2971800" cy="457200"/>
+          </a:xfrm>
+          <a:prstGeom prst="rect">
+            <a:avLst/>
+          </a:prstGeom>
+        </p:spPr>
+        <p:txBody>
+          <a:bodyPr vert="horz" lIns="91440" tIns="45720" rIns="91440" bIns="45720" rtlCol="0" anchor="b"/>
+          <a:lstStyle>
+            <a:lvl1pPr algn="r">
+              <a:defRPr sz="1200"/>
+            </a:lvl1pPr>
+          </a:lstStyle>
+          <a:p>
+            <a:fld id="{C41573AF-D93F-2D48-A485-A84534C0726B}" type="slidenum">
+              <a:rPr lang="en-US" smtClean="0"/>
+              <a:t>‹#›</a:t>
+            </a:fld>
+            <a:endParaRPr lang="en-US"/>
+          </a:p>
+        </p:txBody>
+      </p:sp>
+    </p:spTree>
+    <p:extLst>
+      <p:ext uri="{BB962C8B-B14F-4D97-AF65-F5344CB8AC3E}">
+        <p14:creationId xmlns:p14="http://schemas.microsoft.com/office/powerpoint/2010/main" val="3570216937"/>
+      </p:ext>
+    </p:extLst>
+  </p:cSld>
+  <p:clrMap bg1="lt1" tx1="dk1" bg2="lt2" tx2="dk2" accent1="accent1" accent2="accent2" accent3="accent3" accent4="accent4" accent5="accent5" accent6="accent6" hlink="hlink" folHlink="folHlink"/>
+  <p:notesStyle>
+    <a:lvl1pPr marL="0" algn="l" defTabSz="457200" rtl="0" eaLnBrk="1" latinLnBrk="0" hangingPunct="1">
+      <a:defRPr sz="1200" kern="1200">
+        <a:solidFill>
+          <a:schemeClr val="tx1"/>
+        </a:solidFill>
+        <a:latin typeface="+mn-lt"/>
+        <a:ea typeface="+mn-ea"/>
+        <a:cs typeface="+mn-cs"/>
+      </a:defRPr>
+    </a:lvl1pPr>
+    <a:lvl2pPr marL="457200" algn="l" defTabSz="457200" rtl="0" eaLnBrk="1" latinLnBrk="0" hangingPunct="1">
+      <a:defRPr sz="1200" kern="1200">
+        <a:solidFill>
+          <a:schemeClr val="tx1"/>
+        </a:solidFill>
+        <a:latin typeface="+mn-lt"/>
+        <a:ea typeface="+mn-ea"/>
+        <a:cs typeface="+mn-cs"/>
+      </a:defRPr>
+    </a:lvl2pPr>
+    <a:lvl3pPr marL="914400" algn="l" defTabSz="457200" rtl="0" eaLnBrk="1" latinLnBrk="0" hangingPunct="1">
+      <a:defRPr sz="1200" kern="1200">
+        <a:solidFill>
+          <a:schemeClr val="tx1"/>
+        </a:solidFill>
+        <a:latin typeface="+mn-lt"/>
+        <a:ea typeface="+mn-ea"/>
+        <a:cs typeface="+mn-cs"/>
+      </a:defRPr>
+    </a:lvl3pPr>
+    <a:lvl4pPr marL="1371600" algn="l" defTabSz="457200" rtl="0" eaLnBrk="1" latinLnBrk="0" hangingPunct="1">
+      <a:defRPr sz="1200" kern="1200">
+        <a:solidFill>
+          <a:schemeClr val="tx1"/>
+        </a:solidFill>
+        <a:latin typeface="+mn-lt"/>
+        <a:ea typeface="+mn-ea"/>
+        <a:cs typeface="+mn-cs"/>
+      </a:defRPr>
+    </a:lvl4pPr>
+    <a:lvl5pPr marL="1828800" algn="l" defTabSz="457200" rtl="0" eaLnBrk="1" latinLnBrk="0" hangingPunct="1">
+      <a:defRPr sz="1200" kern="1200">
+        <a:solidFill>
+          <a:schemeClr val="tx1"/>
+        </a:solidFill>
+        <a:latin typeface="+mn-lt"/>
+        <a:ea typeface="+mn-ea"/>
+        <a:cs typeface="+mn-cs"/>
+      </a:defRPr>
+    </a:lvl5pPr>
+    <a:lvl6pPr marL="2286000" algn="l" defTabSz="457200" rtl="0" eaLnBrk="1" latinLnBrk="0" hangingPunct="1">
+      <a:defRPr sz="1200" kern="1200">
+        <a:solidFill>
+          <a:schemeClr val="tx1"/>
+        </a:solidFill>
+        <a:latin typeface="+mn-lt"/>
+        <a:ea typeface="+mn-ea"/>
+        <a:cs typeface="+mn-cs"/>
+      </a:defRPr>
+    </a:lvl6pPr>
+    <a:lvl7pPr marL="2743200" algn="l" defTabSz="457200" rtl="0" eaLnBrk="1" latinLnBrk="0" hangingPunct="1">
+      <a:defRPr sz="1200" kern="1200">
+        <a:solidFill>
+          <a:schemeClr val="tx1"/>
+        </a:solidFill>
+        <a:latin typeface="+mn-lt"/>
+        <a:ea typeface="+mn-ea"/>
+        <a:cs typeface="+mn-cs"/>
+      </a:defRPr>
+    </a:lvl7pPr>
+    <a:lvl8pPr marL="3200400" algn="l" defTabSz="457200" rtl="0" eaLnBrk="1" latinLnBrk="0" hangingPunct="1">
+      <a:defRPr sz="1200" kern="1200">
+        <a:solidFill>
+          <a:schemeClr val="tx1"/>
+        </a:solidFill>
+        <a:latin typeface="+mn-lt"/>
+        <a:ea typeface="+mn-ea"/>
+        <a:cs typeface="+mn-cs"/>
+      </a:defRPr>
+    </a:lvl8pPr>
+    <a:lvl9pPr marL="3657600" algn="l" defTabSz="457200" rtl="0" eaLnBrk="1" latinLnBrk="0" hangingPunct="1">
+      <a:defRPr sz="1200" kern="1200">
+        <a:solidFill>
+          <a:schemeClr val="tx1"/>
+        </a:solidFill>
+        <a:latin typeface="+mn-lt"/>
+        <a:ea typeface="+mn-ea"/>
+        <a:cs typeface="+mn-cs"/>
+      </a:defRPr>
+    </a:lvl9pPr>
+  </p:notesStyle>
+</p:notesMaster>
+</file>
+
+<file path=ppt/notesSlides/notesSlide1.xml><?xml version="1.0" encoding="utf-8"?>
+<p:notes xmlns:a="http://schemas.openxmlformats.org/drawingml/2006/main" xmlns:r="http://schemas.openxmlformats.org/officeDocument/2006/relationships" xmlns:p="http://schemas.openxmlformats.org/presentationml/2006/main">
+  <p:cSld>
+    <p:spTree>
+      <p:nvGrpSpPr>
+        <p:cNvPr id="1" name=""/>
+        <p:cNvGrpSpPr/>
+        <p:nvPr/>
+      </p:nvGrpSpPr>
+      <p:grpSpPr>
+        <a:xfrm>
+          <a:off x="0" y="0"/>
+          <a:ext cx="0" cy="0"/>
+          <a:chOff x="0" y="0"/>
+          <a:chExt cx="0" cy="0"/>
+        </a:xfrm>
+      </p:grpSpPr>
+      <p:sp>
+        <p:nvSpPr>
+          <p:cNvPr id="2" name="Slide Image Placeholder 1"/>
+          <p:cNvSpPr>
+            <a:spLocks noGrp="1" noRot="1" noChangeAspect="1"/>
+          </p:cNvSpPr>
+          <p:nvPr>
+            <p:ph type="sldImg"/>
+          </p:nvPr>
+        </p:nvSpPr>
+        <p:spPr/>
+      </p:sp>
+      <p:sp>
+        <p:nvSpPr>
+          <p:cNvPr id="3" name="Notes Placeholder 2"/>
+          <p:cNvSpPr>
+            <a:spLocks noGrp="1"/>
+          </p:cNvSpPr>
+          <p:nvPr>
+            <p:ph type="body" idx="1"/>
+          </p:nvPr>
+        </p:nvSpPr>
+        <p:spPr/>
+        <p:txBody>
+          <a:bodyPr/>
+          <a:lstStyle/>
+          <a:p>
+            <a:endParaRPr lang="en-US" dirty="0"/>
+          </a:p>
+        </p:txBody>
+      </p:sp>
+      <p:sp>
+        <p:nvSpPr>
+          <p:cNvPr id="4" name="Slide Number Placeholder 3"/>
+          <p:cNvSpPr>
+            <a:spLocks noGrp="1"/>
+          </p:cNvSpPr>
+          <p:nvPr>
+            <p:ph type="sldNum" sz="quarter" idx="10"/>
+          </p:nvPr>
+        </p:nvSpPr>
+        <p:spPr/>
+        <p:txBody>
+          <a:bodyPr/>
+          <a:lstStyle/>
+          <a:p>
+            <a:fld id="{C41573AF-D93F-2D48-A485-A84534C0726B}" type="slidenum">
+              <a:rPr lang="en-US" smtClean="0"/>
+              <a:t>9</a:t>
+            </a:fld>
+            <a:endParaRPr lang="en-US"/>
+          </a:p>
+        </p:txBody>
+      </p:sp>
+    </p:spTree>
+    <p:extLst>
+      <p:ext uri="{BB962C8B-B14F-4D97-AF65-F5344CB8AC3E}">
+        <p14:creationId xmlns:p14="http://schemas.microsoft.com/office/powerpoint/2010/main" val="3678244833"/>
+      </p:ext>
+    </p:extLst>
+  </p:cSld>
+  <p:clrMapOvr>
+    <a:masterClrMapping/>
+  </p:clrMapOvr>
+</p:notes>
 </file>
 
 <file path=ppt/slideLayouts/slideLayout1.xml><?xml version="1.0" encoding="utf-8"?>
@@ -310,7 +748,7 @@
           <a:p>
             <a:fld id="{226C7FB1-4831-6A4C-9DF2-6EA9AA49499B}" type="datetimeFigureOut">
               <a:rPr lang="en-US" smtClean="0"/>
-              <a:t>8/1/18</a:t>
+              <a:t>10/1/18</a:t>
             </a:fld>
             <a:endParaRPr lang="en-US"/>
           </a:p>
@@ -478,7 +916,7 @@
           <a:p>
             <a:fld id="{226C7FB1-4831-6A4C-9DF2-6EA9AA49499B}" type="datetimeFigureOut">
               <a:rPr lang="en-US" smtClean="0"/>
-              <a:t>8/1/18</a:t>
+              <a:t>10/1/18</a:t>
             </a:fld>
             <a:endParaRPr lang="en-US"/>
           </a:p>
@@ -656,7 +1094,7 @@
           <a:p>
             <a:fld id="{226C7FB1-4831-6A4C-9DF2-6EA9AA49499B}" type="datetimeFigureOut">
               <a:rPr lang="en-US" smtClean="0"/>
-              <a:t>8/1/18</a:t>
+              <a:t>10/1/18</a:t>
             </a:fld>
             <a:endParaRPr lang="en-US"/>
           </a:p>
@@ -824,7 +1262,7 @@
           <a:p>
             <a:fld id="{226C7FB1-4831-6A4C-9DF2-6EA9AA49499B}" type="datetimeFigureOut">
               <a:rPr lang="en-US" smtClean="0"/>
-              <a:t>8/1/18</a:t>
+              <a:t>10/1/18</a:t>
             </a:fld>
             <a:endParaRPr lang="en-US"/>
           </a:p>
@@ -1069,7 +1507,7 @@
           <a:p>
             <a:fld id="{226C7FB1-4831-6A4C-9DF2-6EA9AA49499B}" type="datetimeFigureOut">
               <a:rPr lang="en-US" smtClean="0"/>
-              <a:t>8/1/18</a:t>
+              <a:t>10/1/18</a:t>
             </a:fld>
             <a:endParaRPr lang="en-US"/>
           </a:p>
@@ -1354,7 +1792,7 @@
           <a:p>
             <a:fld id="{226C7FB1-4831-6A4C-9DF2-6EA9AA49499B}" type="datetimeFigureOut">
               <a:rPr lang="en-US" smtClean="0"/>
-              <a:t>8/1/18</a:t>
+              <a:t>10/1/18</a:t>
             </a:fld>
             <a:endParaRPr lang="en-US"/>
           </a:p>
@@ -1778,7 +2216,7 @@
           <a:p>
             <a:fld id="{226C7FB1-4831-6A4C-9DF2-6EA9AA49499B}" type="datetimeFigureOut">
               <a:rPr lang="en-US" smtClean="0"/>
-              <a:t>8/1/18</a:t>
+              <a:t>10/1/18</a:t>
             </a:fld>
             <a:endParaRPr lang="en-US"/>
           </a:p>
@@ -1895,7 +2333,7 @@
           <a:p>
             <a:fld id="{226C7FB1-4831-6A4C-9DF2-6EA9AA49499B}" type="datetimeFigureOut">
               <a:rPr lang="en-US" smtClean="0"/>
-              <a:t>8/1/18</a:t>
+              <a:t>10/1/18</a:t>
             </a:fld>
             <a:endParaRPr lang="en-US"/>
           </a:p>
@@ -1990,7 +2428,7 @@
           <a:p>
             <a:fld id="{226C7FB1-4831-6A4C-9DF2-6EA9AA49499B}" type="datetimeFigureOut">
               <a:rPr lang="en-US" smtClean="0"/>
-              <a:t>8/1/18</a:t>
+              <a:t>10/1/18</a:t>
             </a:fld>
             <a:endParaRPr lang="en-US"/>
           </a:p>
@@ -2265,7 +2703,7 @@
           <a:p>
             <a:fld id="{226C7FB1-4831-6A4C-9DF2-6EA9AA49499B}" type="datetimeFigureOut">
               <a:rPr lang="en-US" smtClean="0"/>
-              <a:t>8/1/18</a:t>
+              <a:t>10/1/18</a:t>
             </a:fld>
             <a:endParaRPr lang="en-US"/>
           </a:p>
@@ -2517,7 +2955,7 @@
           <a:p>
             <a:fld id="{226C7FB1-4831-6A4C-9DF2-6EA9AA49499B}" type="datetimeFigureOut">
               <a:rPr lang="en-US" smtClean="0"/>
-              <a:t>8/1/18</a:t>
+              <a:t>10/1/18</a:t>
             </a:fld>
             <a:endParaRPr lang="en-US"/>
           </a:p>
@@ -2728,7 +3166,7 @@
           <a:p>
             <a:fld id="{226C7FB1-4831-6A4C-9DF2-6EA9AA49499B}" type="datetimeFigureOut">
               <a:rPr lang="en-US" smtClean="0"/>
-              <a:t>8/1/18</a:t>
+              <a:t>10/1/18</a:t>
             </a:fld>
             <a:endParaRPr lang="en-US"/>
           </a:p>
@@ -3203,6 +3641,97 @@
 </p:sld>
 </file>
 
+<file path=ppt/slides/slide10.xml><?xml version="1.0" encoding="utf-8"?>
+<p:sld xmlns:a="http://schemas.openxmlformats.org/drawingml/2006/main" xmlns:r="http://schemas.openxmlformats.org/officeDocument/2006/relationships" xmlns:p="http://schemas.openxmlformats.org/presentationml/2006/main">
+  <p:cSld>
+    <p:bg>
+      <p:bgPr>
+        <a:solidFill>
+          <a:schemeClr val="tx1"/>
+        </a:solidFill>
+        <a:effectLst/>
+      </p:bgPr>
+    </p:bg>
+    <p:spTree>
+      <p:nvGrpSpPr>
+        <p:cNvPr id="1" name=""/>
+        <p:cNvGrpSpPr/>
+        <p:nvPr/>
+      </p:nvGrpSpPr>
+      <p:grpSpPr>
+        <a:xfrm>
+          <a:off x="0" y="0"/>
+          <a:ext cx="0" cy="0"/>
+          <a:chOff x="0" y="0"/>
+          <a:chExt cx="0" cy="0"/>
+        </a:xfrm>
+      </p:grpSpPr>
+      <p:sp>
+        <p:nvSpPr>
+          <p:cNvPr id="2" name="Title 1"/>
+          <p:cNvSpPr>
+            <a:spLocks noGrp="1"/>
+          </p:cNvSpPr>
+          <p:nvPr>
+            <p:ph type="ctrTitle"/>
+          </p:nvPr>
+        </p:nvSpPr>
+        <p:spPr>
+          <a:xfrm>
+            <a:off x="0" y="173918"/>
+            <a:ext cx="4578662" cy="4163620"/>
+          </a:xfrm>
+        </p:spPr>
+        <p:txBody>
+          <a:bodyPr>
+            <a:noAutofit/>
+          </a:bodyPr>
+          <a:lstStyle/>
+          <a:p>
+            <a:r>
+              <a:rPr lang="en-US" sz="9600" b="1" dirty="0">
+                <a:solidFill>
+                  <a:srgbClr val="FF0000"/>
+                </a:solidFill>
+              </a:rPr>
+              <a:t>491</a:t>
+            </a:r>
+            <a:br>
+              <a:rPr lang="en-US" sz="9600" b="1" dirty="0">
+                <a:solidFill>
+                  <a:srgbClr val="FF0000"/>
+                </a:solidFill>
+              </a:rPr>
+            </a:br>
+            <a:r>
+              <a:rPr lang="en-US" sz="9600" b="1" dirty="0">
+                <a:solidFill>
+                  <a:srgbClr val="FF0000"/>
+                </a:solidFill>
+              </a:rPr>
+              <a:t>f17</a:t>
+            </a:r>
+            <a:endParaRPr lang="en-US" sz="9600" b="1" dirty="0">
+              <a:solidFill>
+                <a:srgbClr val="00BDFF"/>
+              </a:solidFill>
+            </a:endParaRPr>
+          </a:p>
+        </p:txBody>
+      </p:sp>
+    </p:spTree>
+    <p:extLst>
+      <p:ext uri="{BB962C8B-B14F-4D97-AF65-F5344CB8AC3E}">
+        <p14:creationId xmlns:p14="http://schemas.microsoft.com/office/powerpoint/2010/main" val="702304255"/>
+      </p:ext>
+    </p:extLst>
+  </p:cSld>
+  <p:clrMapOvr>
+    <a:masterClrMapping/>
+  </p:clrMapOvr>
+</p:sld>
+</file>
+
 <file path=ppt/slides/slide2.xml><?xml version="1.0" encoding="utf-8"?>
 <p:sld xmlns:a="http://schemas.openxmlformats.org/drawingml/2006/main" xmlns:r="http://schemas.openxmlformats.org/officeDocument/2006/relationships" xmlns:p="http://schemas.openxmlformats.org/presentationml/2006/main">
   <p:cSld>
@@ -3927,7 +4456,10 @@
     <p:bg>
       <p:bgPr>
         <a:solidFill>
-          <a:schemeClr val="tx1"/>
+          <a:schemeClr val="accent1">
+            <a:lumMod val="40000"/>
+            <a:lumOff val="60000"/>
+          </a:schemeClr>
         </a:solidFill>
         <a:effectLst/>
       </p:bgPr>
@@ -3971,38 +4503,68 @@
             <a:r>
               <a:rPr lang="en-US" sz="9600" b="1" dirty="0">
                 <a:solidFill>
-                  <a:srgbClr val="FF0000"/>
+                  <a:schemeClr val="accent6">
+                    <a:lumMod val="75000"/>
+                  </a:schemeClr>
                 </a:solidFill>
               </a:rPr>
-              <a:t>491</a:t>
+              <a:t>HSJ</a:t>
             </a:r>
             <a:br>
               <a:rPr lang="en-US" sz="9600" b="1" dirty="0">
                 <a:solidFill>
-                  <a:srgbClr val="FF0000"/>
+                  <a:schemeClr val="accent6">
+                    <a:lumMod val="75000"/>
+                  </a:schemeClr>
                 </a:solidFill>
               </a:rPr>
             </a:br>
             <a:r>
+              <a:rPr lang="en-US" sz="9600" b="1" dirty="0" smtClean="0">
+                <a:solidFill>
+                  <a:schemeClr val="accent6">
+                    <a:lumMod val="75000"/>
+                  </a:schemeClr>
+                </a:solidFill>
+              </a:rPr>
+              <a:t>Aug</a:t>
+            </a:r>
+            <a:r>
               <a:rPr lang="en-US" sz="9600" b="1" dirty="0">
                 <a:solidFill>
-                  <a:srgbClr val="FF0000"/>
+                  <a:schemeClr val="accent6">
+                    <a:lumMod val="75000"/>
+                  </a:schemeClr>
                 </a:solidFill>
               </a:rPr>
-              <a:t>f17</a:t>
-            </a:r>
-            <a:endParaRPr lang="en-US" sz="9600" b="1" dirty="0">
-              <a:solidFill>
-                <a:srgbClr val="00BDFF"/>
-              </a:solidFill>
-            </a:endParaRPr>
+              <a:t/>
+            </a:r>
+            <a:br>
+              <a:rPr lang="en-US" sz="9600" b="1" dirty="0">
+                <a:solidFill>
+                  <a:schemeClr val="accent6">
+                    <a:lumMod val="75000"/>
+                  </a:schemeClr>
+                </a:solidFill>
+              </a:rPr>
+            </a:br>
+            <a:r>
+              <a:rPr lang="en-US" sz="9600" b="1" dirty="0">
+                <a:solidFill>
+                  <a:schemeClr val="accent6">
+                    <a:lumMod val="75000"/>
+                  </a:schemeClr>
+                </a:solidFill>
+              </a:rPr>
+              <a:t>2018</a:t>
+            </a:r>
           </a:p>
         </p:txBody>
       </p:sp>
     </p:spTree>
     <p:extLst>
       <p:ext uri="{BB962C8B-B14F-4D97-AF65-F5344CB8AC3E}">
-        <p14:creationId xmlns:p14="http://schemas.microsoft.com/office/powerpoint/2010/main" val="702304255"/>
+        <p14:creationId xmlns:p14="http://schemas.microsoft.com/office/powerpoint/2010/main" val="113409256"/>
       </p:ext>
     </p:extLst>
   </p:cSld>
@@ -4330,4 +4892,324 @@
   </a:objectDefaults>
   <a:extraClrSchemeLst/>
 </a:theme>
+</file>
+
+<file path=ppt/theme/theme2.xml><?xml version="1.0" encoding="utf-8"?>
+<a:theme xmlns:a="http://schemas.openxmlformats.org/drawingml/2006/main" name="Office Theme">
+  <a:themeElements>
+    <a:clrScheme name="Office">
+      <a:dk1>
+        <a:sysClr val="windowText" lastClr="000000"/>
+      </a:dk1>
+      <a:lt1>
+        <a:sysClr val="window" lastClr="FFFFFF"/>
+      </a:lt1>
+      <a:dk2>
+        <a:srgbClr val="1F497D"/>
+      </a:dk2>
+      <a:lt2>
+        <a:srgbClr val="EEECE1"/>
+      </a:lt2>
+      <a:accent1>
+        <a:srgbClr val="4F81BD"/>
+      </a:accent1>
+      <a:accent2>
+        <a:srgbClr val="C0504D"/>
+      </a:accent2>
+      <a:accent3>
+        <a:srgbClr val="9BBB59"/>
+      </a:accent3>
+      <a:accent4>
+        <a:srgbClr val="8064A2"/>
+      </a:accent4>
+      <a:accent5>
+        <a:srgbClr val="4BACC6"/>
+      </a:accent5>
+      <a:accent6>
+        <a:srgbClr val="F79646"/>
+      </a:accent6>
+      <a:hlink>
+        <a:srgbClr val="0000FF"/>
+      </a:hlink>
+      <a:folHlink>
+        <a:srgbClr val="800080"/>
+      </a:folHlink>
+    </a:clrScheme>
+    <a:fontScheme name="Office">
+      <a:majorFont>
+        <a:latin typeface="Calibri"/>
+        <a:ea typeface=""/>
+        <a:cs typeface=""/>
+        <a:font script="Jpan" typeface="ＭＳ Ｐゴシック"/>
+        <a:font script="Hang" typeface="맑은 고딕"/>
+        <a:font script="Hans" typeface="宋体"/>
+        <a:font script="Hant" typeface="新細明體"/>
+        <a:font script="Arab" typeface="Times New Roman"/>
+        <a:font script="Hebr" typeface="Times New Roman"/>
+        <a:font script="Thai" typeface="Angsana New"/>
+        <a:font script="Ethi" typeface="Nyala"/>
+        <a:font script="Beng" typeface="Vrinda"/>
+        <a:font script="Gujr" typeface="Shruti"/>
+        <a:font script="Khmr" typeface="MoolBoran"/>
+        <a:font script="Knda" typeface="Tunga"/>
+        <a:font script="Guru" typeface="Raavi"/>
+        <a:font script="Cans" typeface="Euphemia"/>
+        <a:font script="Cher" typeface="Plantagenet Cherokee"/>
+        <a:font script="Yiii" typeface="Microsoft Yi Baiti"/>
+        <a:font script="Tibt" typeface="Microsoft Himalaya"/>
+        <a:font script="Thaa" typeface="MV Boli"/>
+        <a:font script="Deva" typeface="Mangal"/>
+        <a:font script="Telu" typeface="Gautami"/>
+        <a:font script="Taml" typeface="Latha"/>
+        <a:font script="Syrc" typeface="Estrangelo Edessa"/>
+        <a:font script="Orya" typeface="Kalinga"/>
+        <a:font script="Mlym" typeface="Kartika"/>
+        <a:font script="Laoo" typeface="DokChampa"/>
+        <a:font script="Sinh" typeface="Iskoola Pota"/>
+        <a:font script="Mong" typeface="Mongolian Baiti"/>
+        <a:font script="Viet" typeface="Times New Roman"/>
+        <a:font script="Uigh" typeface="Microsoft Uighur"/>
+        <a:font script="Geor" typeface="Sylfaen"/>
+      </a:majorFont>
+      <a:minorFont>
+        <a:latin typeface="Calibri"/>
+        <a:ea typeface=""/>
+        <a:cs typeface=""/>
+        <a:font script="Jpan" typeface="ＭＳ Ｐゴシック"/>
+        <a:font script="Hang" typeface="맑은 고딕"/>
+        <a:font script="Hans" typeface="宋体"/>
+        <a:font script="Hant" typeface="新細明體"/>
+        <a:font script="Arab" typeface="Arial"/>
+        <a:font script="Hebr" typeface="Arial"/>
+        <a:font script="Thai" typeface="Cordia New"/>
+        <a:font script="Ethi" typeface="Nyala"/>
+        <a:font script="Beng" typeface="Vrinda"/>
+        <a:font script="Gujr" typeface="Shruti"/>
+        <a:font script="Khmr" typeface="DaunPenh"/>
+        <a:font script="Knda" typeface="Tunga"/>
+        <a:font script="Guru" typeface="Raavi"/>
+        <a:font script="Cans" typeface="Euphemia"/>
+        <a:font script="Cher" typeface="Plantagenet Cherokee"/>
+        <a:font script="Yiii" typeface="Microsoft Yi Baiti"/>
+        <a:font script="Tibt" typeface="Microsoft Himalaya"/>
+        <a:font script="Thaa" typeface="MV Boli"/>
+        <a:font script="Deva" typeface="Mangal"/>
+        <a:font script="Telu" typeface="Gautami"/>
+        <a:font script="Taml" typeface="Latha"/>
+        <a:font script="Syrc" typeface="Estrangelo Edessa"/>
+        <a:font script="Orya" typeface="Kalinga"/>
+        <a:font script="Mlym" typeface="Kartika"/>
+        <a:font script="Laoo" typeface="DokChampa"/>
+        <a:font script="Sinh" typeface="Iskoola Pota"/>
+        <a:font script="Mong" typeface="Mongolian Baiti"/>
+        <a:font script="Viet" typeface="Arial"/>
+        <a:font script="Uigh" typeface="Microsoft Uighur"/>
+        <a:font script="Geor" typeface="Sylfaen"/>
+      </a:minorFont>
+    </a:fontScheme>
+    <a:fmtScheme name="Office">
+      <a:fillStyleLst>
+        <a:solidFill>
+          <a:schemeClr val="phClr"/>
+        </a:solidFill>
+        <a:gradFill rotWithShape="1">
+          <a:gsLst>
+            <a:gs pos="0">
+              <a:schemeClr val="phClr">
+                <a:tint val="50000"/>
+                <a:satMod val="300000"/>
+              </a:schemeClr>
+            </a:gs>
+            <a:gs pos="35000">
+              <a:schemeClr val="phClr">
+                <a:tint val="37000"/>
+                <a:satMod val="300000"/>
+              </a:schemeClr>
+            </a:gs>
+            <a:gs pos="100000">
+              <a:schemeClr val="phClr">
+                <a:tint val="15000"/>
+                <a:satMod val="350000"/>
+              </a:schemeClr>
+            </a:gs>
+          </a:gsLst>
+          <a:lin ang="16200000" scaled="1"/>
+        </a:gradFill>
+        <a:gradFill rotWithShape="1">
+          <a:gsLst>
+            <a:gs pos="0">
+              <a:schemeClr val="phClr">
+                <a:tint val="100000"/>
+                <a:shade val="100000"/>
+                <a:satMod val="130000"/>
+              </a:schemeClr>
+            </a:gs>
+            <a:gs pos="100000">
+              <a:schemeClr val="phClr">
+                <a:tint val="50000"/>
+                <a:shade val="100000"/>
+                <a:satMod val="350000"/>
+              </a:schemeClr>
+            </a:gs>
+          </a:gsLst>
+          <a:lin ang="16200000" scaled="0"/>
+        </a:gradFill>
+      </a:fillStyleLst>
+      <a:lnStyleLst>
+        <a:ln w="9525" cap="flat" cmpd="sng" algn="ctr">
+          <a:solidFill>
+            <a:schemeClr val="phClr">
+              <a:shade val="95000"/>
+              <a:satMod val="105000"/>
+            </a:schemeClr>
+          </a:solidFill>
+          <a:prstDash val="solid"/>
+        </a:ln>
+        <a:ln w="25400" cap="flat" cmpd="sng" algn="ctr">
+          <a:solidFill>
+            <a:schemeClr val="phClr"/>
+          </a:solidFill>
+          <a:prstDash val="solid"/>
+        </a:ln>
+        <a:ln w="38100" cap="flat" cmpd="sng" algn="ctr">
+          <a:solidFill>
+            <a:schemeClr val="phClr"/>
+          </a:solidFill>
+          <a:prstDash val="solid"/>
+        </a:ln>
+      </a:lnStyleLst>
+      <a:effectStyleLst>
+        <a:effectStyle>
+          <a:effectLst>
+            <a:outerShdw blurRad="40000" dist="20000" dir="5400000" rotWithShape="0">
+              <a:srgbClr val="000000">
+                <a:alpha val="38000"/>
+              </a:srgbClr>
+            </a:outerShdw>
+          </a:effectLst>
+        </a:effectStyle>
+        <a:effectStyle>
+          <a:effectLst>
+            <a:outerShdw blurRad="40000" dist="23000" dir="5400000" rotWithShape="0">
+              <a:srgbClr val="000000">
+                <a:alpha val="35000"/>
+              </a:srgbClr>
+            </a:outerShdw>
+          </a:effectLst>
+        </a:effectStyle>
+        <a:effectStyle>
+          <a:effectLst>
+            <a:outerShdw blurRad="40000" dist="23000" dir="5400000" rotWithShape="0">
+              <a:srgbClr val="000000">
+                <a:alpha val="35000"/>
+              </a:srgbClr>
+            </a:outerShdw>
+          </a:effectLst>
+          <a:scene3d>
+            <a:camera prst="orthographicFront">
+              <a:rot lat="0" lon="0" rev="0"/>
+            </a:camera>
+            <a:lightRig rig="threePt" dir="t">
+              <a:rot lat="0" lon="0" rev="1200000"/>
+            </a:lightRig>
+          </a:scene3d>
+          <a:sp3d>
+            <a:bevelT w="63500" h="25400"/>
+          </a:sp3d>
+        </a:effectStyle>
+      </a:effectStyleLst>
+      <a:bgFillStyleLst>
+        <a:solidFill>
+          <a:schemeClr val="phClr"/>
+        </a:solidFill>
+        <a:gradFill rotWithShape="1">
+          <a:gsLst>
+            <a:gs pos="0">
+              <a:schemeClr val="phClr">
+                <a:tint val="40000"/>
+                <a:satMod val="350000"/>
+              </a:schemeClr>
+            </a:gs>
+            <a:gs pos="40000">
+              <a:schemeClr val="phClr">
+                <a:tint val="45000"/>
+                <a:shade val="99000"/>
+                <a:satMod val="350000"/>
+              </a:schemeClr>
+            </a:gs>
+            <a:gs pos="100000">
+              <a:schemeClr val="phClr">
+                <a:shade val="20000"/>
+                <a:satMod val="255000"/>
+              </a:schemeClr>
+            </a:gs>
+          </a:gsLst>
+          <a:path path="circle">
+            <a:fillToRect l="50000" t="-80000" r="50000" b="180000"/>
+          </a:path>
+        </a:gradFill>
+        <a:gradFill rotWithShape="1">
+          <a:gsLst>
+            <a:gs pos="0">
+              <a:schemeClr val="phClr">
+                <a:tint val="80000"/>
+                <a:satMod val="300000"/>
+              </a:schemeClr>
+            </a:gs>
+            <a:gs pos="100000">
+              <a:schemeClr val="phClr">
+                <a:shade val="30000"/>
+                <a:satMod val="200000"/>
+              </a:schemeClr>
+            </a:gs>
+          </a:gsLst>
+          <a:path path="circle">
+            <a:fillToRect l="50000" t="50000" r="50000" b="50000"/>
+          </a:path>
+        </a:gradFill>
+      </a:bgFillStyleLst>
+    </a:fmtScheme>
+  </a:themeElements>
+  <a:objectDefaults>
+    <a:spDef>
+      <a:spPr/>
+      <a:bodyPr/>
+      <a:lstStyle/>
+      <a:style>
+        <a:lnRef idx="1">
+          <a:schemeClr val="accent1"/>
+        </a:lnRef>
+        <a:fillRef idx="3">
+          <a:schemeClr val="accent1"/>
+        </a:fillRef>
+        <a:effectRef idx="2">
+          <a:schemeClr val="accent1"/>
+        </a:effectRef>
+        <a:fontRef idx="minor">
+          <a:schemeClr val="lt1"/>
+        </a:fontRef>
+      </a:style>
+    </a:spDef>
+    <a:lnDef>
+      <a:spPr/>
+      <a:bodyPr/>
+      <a:lstStyle/>
+      <a:style>
+        <a:lnRef idx="2">
+          <a:schemeClr val="accent1"/>
+        </a:lnRef>
+        <a:fillRef idx="0">
+          <a:schemeClr val="accent1"/>
+        </a:fillRef>
+        <a:effectRef idx="1">
+          <a:schemeClr val="accent1"/>
+        </a:effectRef>
+        <a:fontRef idx="minor">
+          <a:schemeClr val="tx1"/>
+        </a:fontRef>
+      </a:style>
+    </a:lnDef>
+  </a:objectDefaults>
+  <a:extraClrSchemeLst/>
+</a:theme>
 </file>
</xml_diff>